<commit_message>
BestPractices and Diff-in-Diff Updates
Improved BestPractices and started tracking Diff-in-Diff slides
</commit_message>
<xml_diff>
--- a/Powerpoints/3 Inference.pptx
+++ b/Powerpoints/3 Inference.pptx
@@ -225,7 +225,7 @@
           <a:p>
             <a:fld id="{E723D93F-DE43-BC4C-A115-7456D7C9E421}" type="datetimeFigureOut">
               <a:rPr lang="en-US" smtClean="0"/>
-              <a:t>10/22/21</a:t>
+              <a:t>1/8/22</a:t>
             </a:fld>
             <a:endParaRPr lang="en-US"/>
           </a:p>
@@ -1388,7 +1388,7 @@
           <a:p>
             <a:fld id="{DBAB7D6F-FC53-384C-96BE-9F2C5FAC3370}" type="datetimeFigureOut">
               <a:rPr lang="en-US" smtClean="0"/>
-              <a:t>10/22/21</a:t>
+              <a:t>1/8/22</a:t>
             </a:fld>
             <a:endParaRPr lang="en-US"/>
           </a:p>
@@ -1586,7 +1586,7 @@
           <a:p>
             <a:fld id="{DBAB7D6F-FC53-384C-96BE-9F2C5FAC3370}" type="datetimeFigureOut">
               <a:rPr lang="en-US" smtClean="0"/>
-              <a:t>10/22/21</a:t>
+              <a:t>1/8/22</a:t>
             </a:fld>
             <a:endParaRPr lang="en-US"/>
           </a:p>
@@ -1794,7 +1794,7 @@
           <a:p>
             <a:fld id="{DBAB7D6F-FC53-384C-96BE-9F2C5FAC3370}" type="datetimeFigureOut">
               <a:rPr lang="en-US" smtClean="0"/>
-              <a:t>10/22/21</a:t>
+              <a:t>1/8/22</a:t>
             </a:fld>
             <a:endParaRPr lang="en-US"/>
           </a:p>
@@ -1992,7 +1992,7 @@
           <a:p>
             <a:fld id="{DBAB7D6F-FC53-384C-96BE-9F2C5FAC3370}" type="datetimeFigureOut">
               <a:rPr lang="en-US" smtClean="0"/>
-              <a:t>10/22/21</a:t>
+              <a:t>1/8/22</a:t>
             </a:fld>
             <a:endParaRPr lang="en-US"/>
           </a:p>
@@ -2267,7 +2267,7 @@
           <a:p>
             <a:fld id="{DBAB7D6F-FC53-384C-96BE-9F2C5FAC3370}" type="datetimeFigureOut">
               <a:rPr lang="en-US" smtClean="0"/>
-              <a:t>10/22/21</a:t>
+              <a:t>1/8/22</a:t>
             </a:fld>
             <a:endParaRPr lang="en-US"/>
           </a:p>
@@ -2532,7 +2532,7 @@
           <a:p>
             <a:fld id="{DBAB7D6F-FC53-384C-96BE-9F2C5FAC3370}" type="datetimeFigureOut">
               <a:rPr lang="en-US" smtClean="0"/>
-              <a:t>10/22/21</a:t>
+              <a:t>1/8/22</a:t>
             </a:fld>
             <a:endParaRPr lang="en-US"/>
           </a:p>
@@ -2944,7 +2944,7 @@
           <a:p>
             <a:fld id="{DBAB7D6F-FC53-384C-96BE-9F2C5FAC3370}" type="datetimeFigureOut">
               <a:rPr lang="en-US" smtClean="0"/>
-              <a:t>10/22/21</a:t>
+              <a:t>1/8/22</a:t>
             </a:fld>
             <a:endParaRPr lang="en-US"/>
           </a:p>
@@ -3085,7 +3085,7 @@
           <a:p>
             <a:fld id="{DBAB7D6F-FC53-384C-96BE-9F2C5FAC3370}" type="datetimeFigureOut">
               <a:rPr lang="en-US" smtClean="0"/>
-              <a:t>10/22/21</a:t>
+              <a:t>1/8/22</a:t>
             </a:fld>
             <a:endParaRPr lang="en-US"/>
           </a:p>
@@ -3198,7 +3198,7 @@
           <a:p>
             <a:fld id="{DBAB7D6F-FC53-384C-96BE-9F2C5FAC3370}" type="datetimeFigureOut">
               <a:rPr lang="en-US" smtClean="0"/>
-              <a:t>10/22/21</a:t>
+              <a:t>1/8/22</a:t>
             </a:fld>
             <a:endParaRPr lang="en-US"/>
           </a:p>
@@ -3509,7 +3509,7 @@
           <a:p>
             <a:fld id="{DBAB7D6F-FC53-384C-96BE-9F2C5FAC3370}" type="datetimeFigureOut">
               <a:rPr lang="en-US" smtClean="0"/>
-              <a:t>10/22/21</a:t>
+              <a:t>1/8/22</a:t>
             </a:fld>
             <a:endParaRPr lang="en-US"/>
           </a:p>
@@ -3797,7 +3797,7 @@
           <a:p>
             <a:fld id="{DBAB7D6F-FC53-384C-96BE-9F2C5FAC3370}" type="datetimeFigureOut">
               <a:rPr lang="en-US" smtClean="0"/>
-              <a:t>10/22/21</a:t>
+              <a:t>1/8/22</a:t>
             </a:fld>
             <a:endParaRPr lang="en-US"/>
           </a:p>
@@ -4038,7 +4038,7 @@
           <a:p>
             <a:fld id="{DBAB7D6F-FC53-384C-96BE-9F2C5FAC3370}" type="datetimeFigureOut">
               <a:rPr lang="en-US" smtClean="0"/>
-              <a:t>10/22/21</a:t>
+              <a:t>1/8/22</a:t>
             </a:fld>
             <a:endParaRPr lang="en-US"/>
           </a:p>
@@ -7479,8 +7479,8 @@
           </a:p>
         </p:txBody>
       </p:sp>
-      <mc:AlternateContent xmlns:mc="http://schemas.openxmlformats.org/markup-compatibility/2006" xmlns:a14="http://schemas.microsoft.com/office/drawing/2010/main">
-        <mc:Choice Requires="a14">
+      <mc:AlternateContent xmlns:mc="http://schemas.openxmlformats.org/markup-compatibility/2006">
+        <mc:Choice xmlns:a14="http://schemas.microsoft.com/office/drawing/2010/main" Requires="a14">
           <p:sp>
             <p:nvSpPr>
               <p:cNvPr id="3" name="Content Placeholder 2">
@@ -7517,7 +7517,23 @@
               <a:p>
                 <a:r>
                   <a:rPr lang="en-US" dirty="0"/>
-                  <a:t>For example, you can train an ML model to predict </a:t>
+                  <a:t>Example 1: Coefficients from standard LASSO and Ridge regressions are not consistent, so bootstrapping will not deliver inference results. </a:t>
+                </a:r>
+                <a:r>
+                  <a:rPr lang="en-US" dirty="0">
+                    <a:hlinkClick r:id="rId2" action="ppaction://hlinksldjump"/>
+                  </a:rPr>
+                  <a:t>See Appendix for details.</a:t>
+                </a:r>
+                <a:r>
+                  <a:rPr lang="en-US" dirty="0"/>
+                  <a:t> </a:t>
+                </a:r>
+              </a:p>
+              <a:p>
+                <a:r>
+                  <a:rPr lang="en-US" dirty="0"/>
+                  <a:t>Example 2: you can train an ML model to predict </a:t>
                 </a:r>
                 <a14:m>
                   <m:oMath xmlns:m="http://schemas.openxmlformats.org/officeDocument/2006/math">
@@ -7821,7 +7837,7 @@
             </p:txBody>
           </p:sp>
         </mc:Choice>
-        <mc:Fallback xmlns="">
+        <mc:Fallback>
           <p:sp>
             <p:nvSpPr>
               <p:cNvPr id="3" name="Content Placeholder 2">
@@ -7844,7 +7860,7 @@
                 <a:ext cx="10515600" cy="4486275"/>
               </a:xfrm>
               <a:blipFill>
-                <a:blip r:embed="rId2"/>
+                <a:blip r:embed="rId3"/>
                 <a:stretch>
                   <a:fillRect l="-1086" t="-2254" r="-1327"/>
                 </a:stretch>

</xml_diff>